<commit_message>
Updated Slides and Poster forgot xampp logo
</commit_message>
<xml_diff>
--- a/New folder/Poster/CS499_16Sp_Poster_CC.pptx
+++ b/New folder/Poster/CS499_16Sp_Poster_CC.pptx
@@ -305,7 +305,7 @@
             <a:fld id="{1D8BD707-D9CF-40AE-B4C6-C98DA3205C09}" type="datetimeFigureOut">
               <a:rPr lang="en-US" smtClean="0"/>
               <a:pPr/>
-              <a:t>3/29/2016</a:t>
+              <a:t>4/5/2016</a:t>
             </a:fld>
             <a:endParaRPr lang="en-US"/>
           </a:p>
@@ -555,7 +555,7 @@
             <a:fld id="{1D8BD707-D9CF-40AE-B4C6-C98DA3205C09}" type="datetimeFigureOut">
               <a:rPr lang="en-US" smtClean="0"/>
               <a:pPr/>
-              <a:t>3/29/2016</a:t>
+              <a:t>4/5/2016</a:t>
             </a:fld>
             <a:endParaRPr lang="en-US"/>
           </a:p>
@@ -722,7 +722,7 @@
             <a:fld id="{1D8BD707-D9CF-40AE-B4C6-C98DA3205C09}" type="datetimeFigureOut">
               <a:rPr lang="en-US" smtClean="0"/>
               <a:pPr/>
-              <a:t>3/29/2016</a:t>
+              <a:t>4/5/2016</a:t>
             </a:fld>
             <a:endParaRPr lang="en-US"/>
           </a:p>
@@ -899,7 +899,7 @@
             <a:fld id="{1D8BD707-D9CF-40AE-B4C6-C98DA3205C09}" type="datetimeFigureOut">
               <a:rPr lang="en-US" smtClean="0"/>
               <a:pPr/>
-              <a:t>3/29/2016</a:t>
+              <a:t>4/5/2016</a:t>
             </a:fld>
             <a:endParaRPr lang="en-US"/>
           </a:p>
@@ -1066,7 +1066,7 @@
             <a:fld id="{1D8BD707-D9CF-40AE-B4C6-C98DA3205C09}" type="datetimeFigureOut">
               <a:rPr lang="en-US" smtClean="0"/>
               <a:pPr/>
-              <a:t>3/29/2016</a:t>
+              <a:t>4/5/2016</a:t>
             </a:fld>
             <a:endParaRPr lang="en-US"/>
           </a:p>
@@ -1309,7 +1309,7 @@
             <a:fld id="{1D8BD707-D9CF-40AE-B4C6-C98DA3205C09}" type="datetimeFigureOut">
               <a:rPr lang="en-US" smtClean="0"/>
               <a:pPr/>
-              <a:t>3/29/2016</a:t>
+              <a:t>4/5/2016</a:t>
             </a:fld>
             <a:endParaRPr lang="en-US"/>
           </a:p>
@@ -1594,7 +1594,7 @@
             <a:fld id="{1D8BD707-D9CF-40AE-B4C6-C98DA3205C09}" type="datetimeFigureOut">
               <a:rPr lang="en-US" smtClean="0"/>
               <a:pPr/>
-              <a:t>3/29/2016</a:t>
+              <a:t>4/5/2016</a:t>
             </a:fld>
             <a:endParaRPr lang="en-US"/>
           </a:p>
@@ -2013,7 +2013,7 @@
             <a:fld id="{1D8BD707-D9CF-40AE-B4C6-C98DA3205C09}" type="datetimeFigureOut">
               <a:rPr lang="en-US" smtClean="0"/>
               <a:pPr/>
-              <a:t>3/29/2016</a:t>
+              <a:t>4/5/2016</a:t>
             </a:fld>
             <a:endParaRPr lang="en-US"/>
           </a:p>
@@ -2128,7 +2128,7 @@
             <a:fld id="{1D8BD707-D9CF-40AE-B4C6-C98DA3205C09}" type="datetimeFigureOut">
               <a:rPr lang="en-US" smtClean="0"/>
               <a:pPr/>
-              <a:t>3/29/2016</a:t>
+              <a:t>4/5/2016</a:t>
             </a:fld>
             <a:endParaRPr lang="en-US"/>
           </a:p>
@@ -2220,7 +2220,7 @@
             <a:fld id="{1D8BD707-D9CF-40AE-B4C6-C98DA3205C09}" type="datetimeFigureOut">
               <a:rPr lang="en-US" smtClean="0"/>
               <a:pPr/>
-              <a:t>3/29/2016</a:t>
+              <a:t>4/5/2016</a:t>
             </a:fld>
             <a:endParaRPr lang="en-US"/>
           </a:p>
@@ -2911,7 +2911,7 @@
             <a:fld id="{1D8BD707-D9CF-40AE-B4C6-C98DA3205C09}" type="datetimeFigureOut">
               <a:rPr lang="en-US" smtClean="0"/>
               <a:pPr/>
-              <a:t>3/29/2016</a:t>
+              <a:t>4/5/2016</a:t>
             </a:fld>
             <a:endParaRPr lang="en-US"/>
           </a:p>
@@ -3121,7 +3121,7 @@
             <a:fld id="{1D8BD707-D9CF-40AE-B4C6-C98DA3205C09}" type="datetimeFigureOut">
               <a:rPr lang="en-US" smtClean="0"/>
               <a:pPr/>
-              <a:t>3/29/2016</a:t>
+              <a:t>4/5/2016</a:t>
             </a:fld>
             <a:endParaRPr lang="en-US"/>
           </a:p>
@@ -3560,15 +3560,7 @@
           <a:p>
             <a:r>
               <a:rPr lang="en-US" sz="4400" b="0" dirty="0" smtClean="0"/>
-              <a:t>Web-based </a:t>
-            </a:r>
-            <a:r>
-              <a:rPr lang="en-US" sz="4400" b="0" dirty="0" smtClean="0"/>
-              <a:t>application to track </a:t>
-            </a:r>
-            <a:r>
-              <a:rPr lang="en-US" sz="4400" b="0" dirty="0" smtClean="0"/>
-              <a:t>Troop:</a:t>
+              <a:t>Web-based application to track Troop:</a:t>
             </a:r>
           </a:p>
           <a:p>
@@ -3598,7 +3590,6 @@
               <a:rPr lang="en-US" sz="3200" b="0" dirty="0" smtClean="0"/>
               <a:t>Finances</a:t>
             </a:r>
-            <a:endParaRPr lang="en-US" sz="3200" b="0" dirty="0" smtClean="0"/>
           </a:p>
           <a:p>
             <a:pPr marL="1161288" lvl="1" indent="-457200">
@@ -3627,7 +3618,6 @@
               <a:rPr lang="en-US" sz="3200" b="0" dirty="0" smtClean="0"/>
               <a:t>Awards</a:t>
             </a:r>
-            <a:endParaRPr lang="en-US" sz="3200" b="0" dirty="0" smtClean="0"/>
           </a:p>
           <a:p>
             <a:pPr marL="1161288" lvl="1" indent="-457200">
@@ -3671,15 +3661,7 @@
           <a:p>
             <a:r>
               <a:rPr lang="en-US" dirty="0" smtClean="0"/>
-              <a:t>Matt </a:t>
-            </a:r>
-            <a:r>
-              <a:rPr lang="en-US" dirty="0" smtClean="0"/>
-              <a:t>Eck(DM),</a:t>
-            </a:r>
-            <a:r>
-              <a:rPr lang="en-US" dirty="0" smtClean="0"/>
-              <a:t>Mike </a:t>
+              <a:t>Matt Eck(DM),Mike </a:t>
             </a:r>
             <a:r>
               <a:rPr lang="en-US" dirty="0" err="1" smtClean="0"/>
@@ -3785,7 +3767,6 @@
               <a:rPr lang="en-US" sz="3200" dirty="0" smtClean="0"/>
               <a:t>estimated hours</a:t>
             </a:r>
-            <a:endParaRPr lang="en-US" sz="3200" dirty="0" smtClean="0"/>
           </a:p>
           <a:p>
             <a:pPr>
@@ -3862,11 +3843,7 @@
             </a:pPr>
             <a:r>
               <a:rPr lang="en-US" sz="4400" dirty="0" smtClean="0"/>
-              <a:t>Exit </a:t>
-            </a:r>
-            <a:r>
-              <a:rPr lang="en-US" sz="4400" dirty="0" smtClean="0"/>
-              <a:t>Strategy</a:t>
+              <a:t>Exit Strategy</a:t>
             </a:r>
           </a:p>
           <a:p>
@@ -3999,7 +3976,7 @@
         </p:blipFill>
         <p:spPr>
           <a:xfrm>
-            <a:off x="6352422" y="15697218"/>
+            <a:off x="5780300" y="15727698"/>
             <a:ext cx="2046570" cy="1146079"/>
           </a:xfrm>
           <a:prstGeom prst="rect">
@@ -4029,7 +4006,7 @@
         </p:blipFill>
         <p:spPr>
           <a:xfrm>
-            <a:off x="1593676" y="13646467"/>
+            <a:off x="1921461" y="13692191"/>
             <a:ext cx="1894170" cy="1632143"/>
           </a:xfrm>
           <a:prstGeom prst="rect">
@@ -4059,7 +4036,7 @@
         </p:blipFill>
         <p:spPr>
           <a:xfrm>
-            <a:off x="3467159" y="13895426"/>
+            <a:off x="3815631" y="13875064"/>
             <a:ext cx="2660044" cy="1495425"/>
           </a:xfrm>
           <a:prstGeom prst="rect">
@@ -4089,7 +4066,7 @@
         </p:blipFill>
         <p:spPr>
           <a:xfrm>
-            <a:off x="6257525" y="13597889"/>
+            <a:off x="6541311" y="13626084"/>
             <a:ext cx="1857375" cy="1857375"/>
           </a:xfrm>
           <a:prstGeom prst="rect">
@@ -4119,7 +4096,7 @@
         </p:blipFill>
         <p:spPr>
           <a:xfrm>
-            <a:off x="993901" y="15390851"/>
+            <a:off x="590953" y="15464031"/>
             <a:ext cx="2493945" cy="1875528"/>
           </a:xfrm>
           <a:prstGeom prst="rect">
@@ -4149,7 +4126,7 @@
         </p:blipFill>
         <p:spPr>
           <a:xfrm>
-            <a:off x="3920185" y="15317758"/>
+            <a:off x="3419302" y="15382278"/>
             <a:ext cx="1905000" cy="1905000"/>
           </a:xfrm>
           <a:prstGeom prst="rect">
@@ -4405,6 +4382,36 @@
           </a:p>
         </p:txBody>
       </p:sp>
+      <p:pic>
+        <p:nvPicPr>
+          <p:cNvPr id="2" name="Picture 1"/>
+          <p:cNvPicPr>
+            <a:picLocks noChangeAspect="1"/>
+          </p:cNvPicPr>
+          <p:nvPr/>
+        </p:nvPicPr>
+        <p:blipFill>
+          <a:blip r:embed="rId11">
+            <a:extLst>
+              <a:ext uri="{28A0092B-C50C-407E-A947-70E740481C1C}">
+                <a14:useLocalDpi xmlns:a14="http://schemas.microsoft.com/office/drawing/2010/main" val="0"/>
+              </a:ext>
+            </a:extLst>
+          </a:blip>
+          <a:stretch>
+            <a:fillRect/>
+          </a:stretch>
+        </p:blipFill>
+        <p:spPr>
+          <a:xfrm>
+            <a:off x="8145941" y="15727698"/>
+            <a:ext cx="1066800" cy="1076325"/>
+          </a:xfrm>
+          <a:prstGeom prst="rect">
+            <a:avLst/>
+          </a:prstGeom>
+        </p:spPr>
+      </p:pic>
     </p:spTree>
     <p:extLst>
       <p:ext uri="{BB962C8B-B14F-4D97-AF65-F5344CB8AC3E}">

</xml_diff>